<commit_message>
Added a second page for the actual poster
</commit_message>
<xml_diff>
--- a/poster.pptx
+++ b/poster.pptx
@@ -5,10 +5,11 @@
     <p:sldMasterId id="2147483648" r:id="rId1"/>
   </p:sldMasterIdLst>
   <p:notesMasterIdLst>
-    <p:notesMasterId r:id="rId3"/>
+    <p:notesMasterId r:id="rId4"/>
   </p:notesMasterIdLst>
   <p:sldIdLst>
     <p:sldId id="257" r:id="rId2"/>
+    <p:sldId id="258" r:id="rId3"/>
   </p:sldIdLst>
   <p:sldSz cx="14758988" cy="10333038"/>
   <p:notesSz cx="6858000" cy="9144000"/>
@@ -253,7 +254,7 @@
               <a:pPr>
                 <a:defRPr/>
               </a:pPr>
-              <a:t>5/17/2024</a:t>
+              <a:t>5/20/2024</a:t>
             </a:fld>
             <a:endParaRPr lang="en-US"/>
           </a:p>
@@ -763,7 +764,7 @@
               <a:pPr>
                 <a:defRPr/>
               </a:pPr>
-              <a:t>5/17/2024</a:t>
+              <a:t>5/20/2024</a:t>
             </a:fld>
             <a:endParaRPr lang="en-US"/>
           </a:p>
@@ -1569,14 +1570,14 @@
           </a:ln>
           <a:extLst>
             <a:ext uri="{909E8E84-426E-40dd-AFC4-6F175D3DCCD1}">
-              <a14:hiddenFill xmlns="" xmlns:a14="http://schemas.microsoft.com/office/drawing/2010/main">
+              <a14:hiddenFill xmlns:a14="http://schemas.microsoft.com/office/drawing/2010/main" xmlns="">
                 <a:solidFill>
                   <a:srgbClr val="FFFFFF"/>
                 </a:solidFill>
               </a14:hiddenFill>
             </a:ext>
             <a:ext uri="{91240B29-F687-4f45-9708-019B960494DF}">
-              <a14:hiddenLine xmlns="" xmlns:a14="http://schemas.microsoft.com/office/drawing/2010/main" w="9525">
+              <a14:hiddenLine xmlns:a14="http://schemas.microsoft.com/office/drawing/2010/main" xmlns="" w="9525">
                 <a:solidFill>
                   <a:srgbClr val="000000"/>
                 </a:solidFill>
@@ -1628,14 +1629,14 @@
           </a:ln>
           <a:extLst>
             <a:ext uri="{909E8E84-426E-40dd-AFC4-6F175D3DCCD1}">
-              <a14:hiddenFill xmlns="" xmlns:a14="http://schemas.microsoft.com/office/drawing/2010/main">
+              <a14:hiddenFill xmlns:a14="http://schemas.microsoft.com/office/drawing/2010/main" xmlns="">
                 <a:solidFill>
                   <a:srgbClr val="FFFFFF"/>
                 </a:solidFill>
               </a14:hiddenFill>
             </a:ext>
             <a:ext uri="{91240B29-F687-4f45-9708-019B960494DF}">
-              <a14:hiddenLine xmlns="" xmlns:a14="http://schemas.microsoft.com/office/drawing/2010/main" w="9525">
+              <a14:hiddenLine xmlns:a14="http://schemas.microsoft.com/office/drawing/2010/main" xmlns="" w="9525">
                 <a:solidFill>
                   <a:srgbClr val="000000"/>
                 </a:solidFill>
@@ -1735,7 +1736,7 @@
               <a:pPr>
                 <a:defRPr/>
               </a:pPr>
-              <a:t>5/17/2024</a:t>
+              <a:t>5/20/2024</a:t>
             </a:fld>
             <a:endParaRPr lang="en-US"/>
           </a:p>
@@ -2288,106 +2289,210 @@
                 <a:latin typeface="Bodoni MT" charset="0"/>
                 <a:cs typeface="Helvetica Neue" charset="0"/>
               </a:rPr>
-              <a:t>MAIN HEADINGS – BODONI MT 18PT ALL CAPS</a:t>
-            </a:r>
-          </a:p>
-          <a:p>
-            <a:endParaRPr lang="en-US" sz="1600" dirty="0">
+              <a:t>AIMS(KPI)</a:t>
+            </a:r>
+          </a:p>
+          <a:p>
+            <a:r>
+              <a:rPr lang="en-US" b="1" dirty="0">
+                <a:latin typeface="Helvetica Neue" charset="0"/>
+                <a:cs typeface="Helvetica Neue" charset="0"/>
+              </a:rPr>
+              <a:t>Mesh Network Connectivity</a:t>
+            </a:r>
+          </a:p>
+          <a:p>
+            <a:pPr marL="285750" indent="-285750">
+              <a:buFont typeface="Arial" panose="020B0604020202020204" pitchFamily="34" charset="0"/>
+              <a:buChar char="•"/>
+            </a:pPr>
+            <a:r>
+              <a:rPr lang="en-US" dirty="0">
+                <a:latin typeface="Helvetica Neue" charset="0"/>
+                <a:cs typeface="Helvetica Neue" charset="0"/>
+              </a:rPr>
+              <a:t>Uses Bluetooth Mesh Connection.</a:t>
+            </a:r>
+          </a:p>
+          <a:p>
+            <a:pPr marL="285750" indent="-285750">
+              <a:buFont typeface="Arial" panose="020B0604020202020204" pitchFamily="34" charset="0"/>
+              <a:buChar char="•"/>
+            </a:pPr>
+            <a:r>
+              <a:rPr lang="en-US" dirty="0">
+                <a:latin typeface="Helvetica Neue" charset="0"/>
+                <a:cs typeface="Helvetica Neue" charset="0"/>
+              </a:rPr>
+              <a:t>All stations are interconnected.</a:t>
+            </a:r>
+          </a:p>
+          <a:p>
+            <a:endParaRPr lang="en-US" b="1" dirty="0">
+              <a:latin typeface="Helvetica Neue" charset="0"/>
+              <a:cs typeface="Helvetica Neue" charset="0"/>
+            </a:endParaRPr>
+          </a:p>
+          <a:p>
+            <a:r>
+              <a:rPr lang="en-US" b="1" dirty="0">
+                <a:latin typeface="Helvetica Neue" charset="0"/>
+                <a:cs typeface="Helvetica Neue" charset="0"/>
+              </a:rPr>
+              <a:t>Data Transmission Reliability</a:t>
+            </a:r>
+          </a:p>
+          <a:p>
+            <a:pPr marL="285750" indent="-285750">
+              <a:buFont typeface="Arial" panose="020B0604020202020204" pitchFamily="34" charset="0"/>
+              <a:buChar char="•"/>
+            </a:pPr>
+            <a:r>
+              <a:rPr lang="en-US" dirty="0">
+                <a:latin typeface="Helvetica Neue" charset="0"/>
+                <a:cs typeface="Helvetica Neue" charset="0"/>
+              </a:rPr>
+              <a:t>Reliable data transmission within the network.</a:t>
+            </a:r>
+          </a:p>
+          <a:p>
+            <a:pPr marL="285750" indent="-285750">
+              <a:buFont typeface="Arial" panose="020B0604020202020204" pitchFamily="34" charset="0"/>
+              <a:buChar char="•"/>
+            </a:pPr>
+            <a:r>
+              <a:rPr lang="en-US" dirty="0">
+                <a:latin typeface="Helvetica Neue" charset="0"/>
+                <a:cs typeface="Helvetica Neue" charset="0"/>
+              </a:rPr>
+              <a:t>Accurately transmits data without significant delays or loss.</a:t>
+            </a:r>
+          </a:p>
+          <a:p>
+            <a:endParaRPr lang="en-US" b="1" dirty="0">
+              <a:latin typeface="Helvetica Neue" charset="0"/>
+              <a:cs typeface="Helvetica Neue" charset="0"/>
+            </a:endParaRPr>
+          </a:p>
+          <a:p>
+            <a:r>
+              <a:rPr lang="en-US" b="1" dirty="0">
+                <a:latin typeface="Helvetica Neue" charset="0"/>
+                <a:cs typeface="Helvetica Neue" charset="0"/>
+              </a:rPr>
+              <a:t>Real-Time Visualization</a:t>
+            </a:r>
+          </a:p>
+          <a:p>
+            <a:pPr marL="285750" indent="-285750">
+              <a:buFont typeface="Arial" panose="020B0604020202020204" pitchFamily="34" charset="0"/>
+              <a:buChar char="•"/>
+            </a:pPr>
+            <a:r>
+              <a:rPr lang="en-US" dirty="0">
+                <a:latin typeface="Helvetica Neue" charset="0"/>
+                <a:cs typeface="Helvetica Neue" charset="0"/>
+              </a:rPr>
+              <a:t>Ensure the responsiveness and accuracy of the web dashboard viewer.</a:t>
+            </a:r>
+          </a:p>
+          <a:p>
+            <a:pPr marL="285750" indent="-285750">
+              <a:buFont typeface="Arial" panose="020B0604020202020204" pitchFamily="34" charset="0"/>
+              <a:buChar char="•"/>
+            </a:pPr>
+            <a:r>
+              <a:rPr lang="en-US" dirty="0">
+                <a:latin typeface="Helvetica Neue" charset="0"/>
+                <a:cs typeface="Helvetica Neue" charset="0"/>
+              </a:rPr>
+              <a:t>Display real-time air quality and weather from all stations.</a:t>
+            </a:r>
+          </a:p>
+          <a:p>
+            <a:endParaRPr lang="en-US" b="1" dirty="0">
+              <a:latin typeface="Helvetica Neue" charset="0"/>
+              <a:cs typeface="Helvetica Neue" charset="0"/>
+            </a:endParaRPr>
+          </a:p>
+          <a:p>
+            <a:r>
+              <a:rPr lang="en-US" b="1" dirty="0">
+                <a:latin typeface="Helvetica Neue" charset="0"/>
+                <a:cs typeface="Helvetica Neue" charset="0"/>
+              </a:rPr>
+              <a:t>Node Health Monitoring</a:t>
+            </a:r>
+          </a:p>
+          <a:p>
+            <a:pPr marL="285750" indent="-285750">
+              <a:buFont typeface="Arial" panose="020B0604020202020204" pitchFamily="34" charset="0"/>
+              <a:buChar char="•"/>
+            </a:pPr>
+            <a:r>
+              <a:rPr lang="en-US" dirty="0">
+                <a:latin typeface="Helvetica Neue" charset="0"/>
+                <a:cs typeface="Helvetica Neue" charset="0"/>
+              </a:rPr>
+              <a:t>Monitors individual node health.</a:t>
+            </a:r>
+          </a:p>
+          <a:p>
+            <a:pPr marL="285750" indent="-285750">
+              <a:buFont typeface="Arial" panose="020B0604020202020204" pitchFamily="34" charset="0"/>
+              <a:buChar char="•"/>
+            </a:pPr>
+            <a:r>
+              <a:rPr lang="en-US" dirty="0">
+                <a:latin typeface="Helvetica Neue" charset="0"/>
+                <a:cs typeface="Helvetica Neue" charset="0"/>
+              </a:rPr>
+              <a:t>Tracks battery level, sensor functionality, and connectivity status.</a:t>
+            </a:r>
+          </a:p>
+          <a:p>
+            <a:endParaRPr lang="en-US" b="1" dirty="0">
+              <a:latin typeface="Helvetica Neue" charset="0"/>
+              <a:cs typeface="Helvetica Neue" charset="0"/>
+            </a:endParaRPr>
+          </a:p>
+          <a:p>
+            <a:r>
+              <a:rPr lang="en-US" b="1" dirty="0">
+                <a:latin typeface="Helvetica Neue" charset="0"/>
+                <a:cs typeface="Helvetica Neue" charset="0"/>
+              </a:rPr>
+              <a:t>User Engagement and Feedback</a:t>
+            </a:r>
+            <a:endParaRPr lang="en-AU" dirty="0">
               <a:latin typeface="Bodoni MT" charset="0"/>
               <a:cs typeface="Helvetica Neue" charset="0"/>
             </a:endParaRPr>
           </a:p>
           <a:p>
-            <a:r>
-              <a:rPr lang="en-US" b="1" dirty="0">
-                <a:latin typeface="Helvetica Neue" charset="0"/>
-                <a:cs typeface="Helvetica Neue" charset="0"/>
-              </a:rPr>
-              <a:t>Subheadings – Helvetica Neue Bold 14pt</a:t>
-            </a:r>
-          </a:p>
-          <a:p>
+            <a:pPr marL="285750" indent="-285750">
+              <a:buFont typeface="Arial" panose="020B0604020202020204" pitchFamily="34" charset="0"/>
+              <a:buChar char="•"/>
+            </a:pPr>
             <a:r>
               <a:rPr lang="en-US" dirty="0">
                 <a:latin typeface="Helvetica Neue" charset="0"/>
                 <a:cs typeface="Helvetica Neue" charset="0"/>
               </a:rPr>
-              <a:t>Body Text – Helvetica Neue 14pt (min 12pt)</a:t>
-            </a:r>
-          </a:p>
-          <a:p>
-            <a:endParaRPr lang="en-US" dirty="0">
-              <a:latin typeface="Helvetica Neue" charset="0"/>
-              <a:cs typeface="Helvetica Neue" charset="0"/>
-            </a:endParaRPr>
-          </a:p>
-          <a:p>
-            <a:r>
-              <a:rPr lang="en-US" b="1" dirty="0">
-                <a:latin typeface="Helvetica Neue" charset="0"/>
-                <a:cs typeface="Helvetica Neue" charset="0"/>
-              </a:rPr>
-              <a:t>Don’t have the above fonts installed?</a:t>
-            </a:r>
-          </a:p>
-          <a:p>
+              <a:t>Assesses the engagement and satisfaction of users with the web dashboard viewer</a:t>
+            </a:r>
+          </a:p>
+          <a:p>
+            <a:pPr marL="285750" indent="-285750">
+              <a:buFont typeface="Arial" panose="020B0604020202020204" pitchFamily="34" charset="0"/>
+              <a:buChar char="•"/>
+            </a:pPr>
             <a:r>
               <a:rPr lang="en-US" dirty="0">
                 <a:latin typeface="Helvetica Neue" charset="0"/>
                 <a:cs typeface="Helvetica Neue" charset="0"/>
               </a:rPr>
-              <a:t>Substitutes for Bodoni MT:</a:t>
-            </a:r>
-          </a:p>
-          <a:p>
-            <a:r>
-              <a:rPr lang="en-US" dirty="0">
-                <a:latin typeface="Didot" charset="0"/>
-                <a:cs typeface="Helvetica Neue" charset="0"/>
-              </a:rPr>
-              <a:t>Didot on Apple</a:t>
-            </a:r>
-          </a:p>
-          <a:p>
-            <a:r>
-              <a:rPr lang="en-US" dirty="0">
-                <a:latin typeface="Times New Roman" charset="0"/>
-                <a:cs typeface="Times New Roman" charset="0"/>
-              </a:rPr>
-              <a:t>or Times New Roman (Apple &amp; Windows)</a:t>
-            </a:r>
-          </a:p>
-          <a:p>
-            <a:endParaRPr lang="en-US" dirty="0">
-              <a:latin typeface="Helvetica Neue" charset="0"/>
-              <a:cs typeface="Helvetica Neue" charset="0"/>
-            </a:endParaRPr>
-          </a:p>
-          <a:p>
-            <a:r>
-              <a:rPr lang="en-US" dirty="0">
-                <a:latin typeface="Helvetica Neue" charset="0"/>
-                <a:cs typeface="Helvetica Neue" charset="0"/>
-              </a:rPr>
-              <a:t>Substitutes for Helvetica Neue:</a:t>
-            </a:r>
-          </a:p>
-          <a:p>
-            <a:r>
-              <a:rPr lang="en-US" dirty="0">
-                <a:latin typeface="Helvetica" charset="0"/>
-                <a:cs typeface="Helvetica" charset="0"/>
-              </a:rPr>
-              <a:t>Helvetica (Apple)</a:t>
-            </a:r>
-          </a:p>
-          <a:p>
-            <a:r>
-              <a:rPr lang="en-US" dirty="0">
-                <a:latin typeface="Arial" charset="0"/>
-                <a:cs typeface="Arial" charset="0"/>
-              </a:rPr>
-              <a:t>or Arial (Apple &amp; Windows)</a:t>
+              <a:t>Metrics include, user interaction, feedback submissions, and feature request.</a:t>
             </a:r>
           </a:p>
           <a:p>
@@ -2485,193 +2590,126 @@
           <a:lstStyle/>
           <a:p>
             <a:r>
-              <a:rPr lang="en-US" b="1" dirty="0">
-                <a:latin typeface="Helvetica Neue" charset="0"/>
-                <a:cs typeface="Helvetica Neue" charset="0"/>
-              </a:rPr>
-              <a:t>General Hints &amp; Tips</a:t>
-            </a:r>
-          </a:p>
-          <a:p>
-            <a:r>
-              <a:rPr lang="en-US" b="1" i="1" dirty="0">
-                <a:latin typeface="Helvetica Neue" charset="0"/>
-                <a:cs typeface="Helvetica Neue" charset="0"/>
-              </a:rPr>
-              <a:t>Do not </a:t>
-            </a:r>
-            <a:r>
-              <a:rPr lang="en-US" dirty="0">
-                <a:latin typeface="Helvetica Neue" charset="0"/>
-                <a:cs typeface="Helvetica Neue" charset="0"/>
-              </a:rPr>
-              <a:t>change the </a:t>
-            </a:r>
-            <a:r>
-              <a:rPr lang="en-US" dirty="0" err="1">
-                <a:latin typeface="Helvetica Neue" charset="0"/>
-                <a:cs typeface="Helvetica Neue" charset="0"/>
-              </a:rPr>
-              <a:t>colour</a:t>
-            </a:r>
-            <a:r>
-              <a:rPr lang="en-US" dirty="0">
-                <a:latin typeface="Helvetica Neue" charset="0"/>
-                <a:cs typeface="Helvetica Neue" charset="0"/>
-              </a:rPr>
-              <a:t>/size/logos/positioning of the Slide Master.</a:t>
-            </a:r>
-          </a:p>
-          <a:p>
-            <a:r>
-              <a:rPr lang="en-US" dirty="0">
-                <a:latin typeface="Helvetica Neue" charset="0"/>
-                <a:cs typeface="Helvetica Neue" charset="0"/>
-              </a:rPr>
-              <a:t>This is a standard format across all Innovation Expo posters.</a:t>
-            </a:r>
-          </a:p>
-          <a:p>
-            <a:r>
-              <a:rPr lang="en-US" b="1" i="1" dirty="0">
-                <a:latin typeface="Helvetica Neue" charset="0"/>
-                <a:cs typeface="Helvetica Neue" charset="0"/>
-              </a:rPr>
-              <a:t>Do not </a:t>
-            </a:r>
-            <a:r>
-              <a:rPr lang="en-US" dirty="0">
-                <a:latin typeface="Helvetica Neue" charset="0"/>
-                <a:cs typeface="Helvetica Neue" charset="0"/>
-              </a:rPr>
-              <a:t>add other corporate logos. This is an infringement of copyright, unless you have express permission to do so.</a:t>
-            </a:r>
-          </a:p>
-          <a:p>
-            <a:r>
-              <a:rPr lang="en-US" b="1" i="1" dirty="0">
-                <a:latin typeface="Helvetica Neue" charset="0"/>
-                <a:cs typeface="Helvetica Neue" charset="0"/>
-              </a:rPr>
-              <a:t>Do</a:t>
-            </a:r>
-            <a:r>
-              <a:rPr lang="en-US" dirty="0">
-                <a:latin typeface="Helvetica Neue" charset="0"/>
-                <a:cs typeface="Helvetica Neue" charset="0"/>
-              </a:rPr>
-              <a:t> use this space as creatively as you wish.</a:t>
-            </a:r>
-          </a:p>
-          <a:p>
-            <a:r>
-              <a:rPr lang="en-US" b="1" i="1" dirty="0">
-                <a:latin typeface="Helvetica Neue" charset="0"/>
-                <a:cs typeface="Helvetica Neue" charset="0"/>
-              </a:rPr>
-              <a:t>Avoid </a:t>
-            </a:r>
-            <a:r>
-              <a:rPr lang="en-US" dirty="0">
-                <a:latin typeface="Helvetica Neue" charset="0"/>
-                <a:cs typeface="Helvetica Neue" charset="0"/>
-              </a:rPr>
-              <a:t>using large background </a:t>
-            </a:r>
-            <a:r>
-              <a:rPr lang="en-US" dirty="0" err="1">
-                <a:latin typeface="Helvetica Neue" charset="0"/>
-                <a:cs typeface="Helvetica Neue" charset="0"/>
-              </a:rPr>
-              <a:t>colours</a:t>
-            </a:r>
-            <a:r>
-              <a:rPr lang="en-US" dirty="0">
-                <a:latin typeface="Helvetica Neue" charset="0"/>
-                <a:cs typeface="Helvetica Neue" charset="0"/>
-              </a:rPr>
-              <a:t> – doesn’t print well.</a:t>
-            </a:r>
-          </a:p>
-          <a:p>
-            <a:r>
-              <a:rPr lang="en-US" b="1" i="1" dirty="0">
-                <a:latin typeface="Helvetica Neue" charset="0"/>
-                <a:cs typeface="Helvetica Neue" charset="0"/>
-              </a:rPr>
-              <a:t>Stick to </a:t>
-            </a:r>
-            <a:r>
-              <a:rPr lang="en-US" dirty="0">
-                <a:latin typeface="Helvetica Neue" charset="0"/>
-                <a:cs typeface="Helvetica Neue" charset="0"/>
-              </a:rPr>
-              <a:t>the basic fonts &amp; sizes (left) – these read clearly. If you need to reduce the text size, you are trying to put too much on your poster.</a:t>
-            </a:r>
-          </a:p>
-          <a:p>
-            <a:r>
-              <a:rPr lang="en-US" b="1" i="1" dirty="0">
-                <a:latin typeface="Helvetica Neue" charset="0"/>
-                <a:cs typeface="Helvetica Neue" charset="0"/>
-              </a:rPr>
-              <a:t>As a check</a:t>
-            </a:r>
-            <a:r>
-              <a:rPr lang="en-US" dirty="0">
-                <a:latin typeface="Helvetica Neue" charset="0"/>
-                <a:cs typeface="Helvetica Neue" charset="0"/>
-              </a:rPr>
-              <a:t>, print “scaled to fit” onto A4 and read at arms length.</a:t>
-            </a:r>
-          </a:p>
-          <a:p>
-            <a:r>
-              <a:rPr lang="en-US" b="1" i="1" dirty="0">
-                <a:latin typeface="Helvetica Neue" charset="0"/>
-                <a:cs typeface="Helvetica Neue" charset="0"/>
-              </a:rPr>
-              <a:t>Save </a:t>
-            </a:r>
-            <a:r>
-              <a:rPr lang="en-US" dirty="0">
-                <a:latin typeface="Helvetica Neue" charset="0"/>
-                <a:cs typeface="Helvetica Neue" charset="0"/>
-              </a:rPr>
-              <a:t>your poster as you work on it.</a:t>
-            </a:r>
-          </a:p>
-          <a:p>
-            <a:r>
-              <a:rPr lang="en-US" b="1" i="1" dirty="0">
-                <a:latin typeface="Helvetica Neue" charset="0"/>
-                <a:cs typeface="Helvetica Neue" charset="0"/>
-              </a:rPr>
-              <a:t>You shouldn’t</a:t>
-            </a:r>
-            <a:r>
-              <a:rPr lang="en-US" dirty="0">
-                <a:latin typeface="Helvetica Neue" charset="0"/>
-                <a:cs typeface="Helvetica Neue" charset="0"/>
-              </a:rPr>
-              <a:t> need to change the sizing of this file, it should already be landscape format with width: 41cm and height: 28.7 cm (A3 with 5 mm borders all around).</a:t>
-            </a:r>
-          </a:p>
-          <a:p>
-            <a:r>
-              <a:rPr lang="en-US" b="1" i="1" dirty="0">
-                <a:latin typeface="Helvetica Neue" charset="0"/>
-                <a:cs typeface="Helvetica Neue" charset="0"/>
-              </a:rPr>
-              <a:t>The title </a:t>
-            </a:r>
-            <a:r>
-              <a:rPr lang="en-US" dirty="0">
-                <a:latin typeface="Helvetica Neue" charset="0"/>
-                <a:cs typeface="Helvetica Neue" charset="0"/>
-              </a:rPr>
-              <a:t>may look to close to the top edge – don’t be tempted to change it. It allows for the extra 5mm from the printing.</a:t>
-            </a:r>
+              <a:rPr lang="en-US" sz="1800" dirty="0">
+                <a:latin typeface="Bodoni MT" charset="0"/>
+                <a:cs typeface="Helvetica Neue" charset="0"/>
+              </a:rPr>
+              <a:t>SYSTEM OVERVIEW</a:t>
+            </a:r>
+          </a:p>
+          <a:p>
+            <a:r>
+              <a:rPr lang="en-AU" b="1" dirty="0">
+                <a:latin typeface="Helvetica Neue" charset="0"/>
+                <a:cs typeface="Helvetica Neue" charset="0"/>
+              </a:rPr>
+              <a:t>Hardware Architecture</a:t>
+            </a:r>
+          </a:p>
+          <a:p>
+            <a:endParaRPr lang="en-AU" b="1" dirty="0">
+              <a:latin typeface="Helvetica Neue" charset="0"/>
+              <a:cs typeface="Helvetica Neue" charset="0"/>
+            </a:endParaRPr>
+          </a:p>
+          <a:p>
+            <a:endParaRPr lang="en-AU" b="1" dirty="0">
+              <a:latin typeface="Helvetica Neue" charset="0"/>
+              <a:cs typeface="Helvetica Neue" charset="0"/>
+            </a:endParaRPr>
+          </a:p>
+          <a:p>
+            <a:endParaRPr lang="en-AU" b="1" dirty="0">
+              <a:latin typeface="Helvetica Neue" charset="0"/>
+              <a:cs typeface="Helvetica Neue" charset="0"/>
+            </a:endParaRPr>
+          </a:p>
+          <a:p>
+            <a:endParaRPr lang="en-AU" b="1" dirty="0">
+              <a:latin typeface="Helvetica Neue" charset="0"/>
+              <a:cs typeface="Helvetica Neue" charset="0"/>
+            </a:endParaRPr>
+          </a:p>
+          <a:p>
+            <a:endParaRPr lang="en-AU" b="1" dirty="0">
+              <a:latin typeface="Helvetica Neue" charset="0"/>
+              <a:cs typeface="Helvetica Neue" charset="0"/>
+            </a:endParaRPr>
+          </a:p>
+          <a:p>
+            <a:endParaRPr lang="en-AU" b="1" dirty="0">
+              <a:latin typeface="Helvetica Neue" charset="0"/>
+              <a:cs typeface="Helvetica Neue" charset="0"/>
+            </a:endParaRPr>
+          </a:p>
+          <a:p>
+            <a:endParaRPr lang="en-AU" b="1" dirty="0">
+              <a:latin typeface="Helvetica Neue" charset="0"/>
+              <a:cs typeface="Helvetica Neue" charset="0"/>
+            </a:endParaRPr>
+          </a:p>
+          <a:p>
+            <a:r>
+              <a:rPr lang="en-AU" b="1" dirty="0">
+                <a:latin typeface="Helvetica Neue" charset="0"/>
+                <a:cs typeface="Helvetica Neue" charset="0"/>
+              </a:rPr>
+              <a:t>Top Level Flowchart of Software Implementation</a:t>
+            </a:r>
+          </a:p>
+          <a:p>
+            <a:endParaRPr lang="en-AU" b="1" dirty="0">
+              <a:latin typeface="Helvetica Neue" charset="0"/>
+              <a:cs typeface="Helvetica Neue" charset="0"/>
+            </a:endParaRPr>
+          </a:p>
+          <a:p>
+            <a:endParaRPr lang="en-AU" b="1" dirty="0">
+              <a:latin typeface="Helvetica Neue" charset="0"/>
+              <a:cs typeface="Helvetica Neue" charset="0"/>
+            </a:endParaRPr>
+          </a:p>
+          <a:p>
+            <a:endParaRPr lang="en-US" sz="1800" dirty="0">
+              <a:latin typeface="Bodoni MT" charset="0"/>
+              <a:cs typeface="Helvetica Neue" charset="0"/>
+            </a:endParaRPr>
+          </a:p>
+          <a:p>
+            <a:endParaRPr lang="en-US" sz="1800" dirty="0">
+              <a:latin typeface="Bodoni MT" charset="0"/>
+              <a:cs typeface="Helvetica Neue" charset="0"/>
+            </a:endParaRPr>
+          </a:p>
+          <a:p>
+            <a:endParaRPr lang="en-US" sz="1800" dirty="0">
+              <a:latin typeface="Bodoni MT" charset="0"/>
+              <a:cs typeface="Helvetica Neue" charset="0"/>
+            </a:endParaRPr>
+          </a:p>
+          <a:p>
+            <a:endParaRPr lang="en-US" sz="1800" b="1" dirty="0">
+              <a:latin typeface="Bodoni MT" charset="0"/>
+              <a:cs typeface="Helvetica Neue" charset="0"/>
+            </a:endParaRPr>
+          </a:p>
+          <a:p>
+            <a:endParaRPr lang="en-US" sz="1800" dirty="0">
+              <a:latin typeface="Bodoni MT" charset="0"/>
+              <a:cs typeface="Helvetica Neue" charset="0"/>
+            </a:endParaRPr>
+          </a:p>
+          <a:p>
+            <a:endParaRPr lang="en-US" sz="1800" dirty="0">
+              <a:latin typeface="Bodoni MT" charset="0"/>
+              <a:cs typeface="Helvetica Neue" charset="0"/>
+            </a:endParaRPr>
+          </a:p>
+          <a:p>
+            <a:endParaRPr lang="en-US" dirty="0">
+              <a:latin typeface="Helvetica Neue" charset="0"/>
+              <a:cs typeface="Helvetica Neue" charset="0"/>
+            </a:endParaRPr>
           </a:p>
         </p:txBody>
       </p:sp>
@@ -2701,118 +2739,107 @@
                 <a:latin typeface="Bodoni MT" charset="0"/>
                 <a:cs typeface="Helvetica Neue" charset="0"/>
               </a:rPr>
-              <a:t>AIMS(KPI)</a:t>
-            </a:r>
-          </a:p>
-          <a:p>
-            <a:r>
-              <a:rPr lang="en-US" b="1" dirty="0">
-                <a:latin typeface="Helvetica Neue" charset="0"/>
-                <a:cs typeface="Helvetica Neue" charset="0"/>
-              </a:rPr>
-              <a:t>Mesh Work Networking</a:t>
-            </a:r>
-          </a:p>
-          <a:p>
-            <a:endParaRPr lang="en-US" b="1" dirty="0">
+              <a:t>RESULTS</a:t>
+            </a:r>
+          </a:p>
+          <a:p>
+            <a:r>
+              <a:rPr lang="en-AU" b="1" dirty="0">
+                <a:latin typeface="Helvetica Neue" charset="0"/>
+                <a:cs typeface="Helvetica Neue" charset="0"/>
+              </a:rPr>
+              <a:t>Mesh Network Connectivity:</a:t>
+            </a:r>
+          </a:p>
+          <a:p>
+            <a:pPr marL="285750" indent="-285750">
+              <a:buFont typeface="Arial" panose="020B0604020202020204" pitchFamily="34" charset="0"/>
+              <a:buChar char="•"/>
+            </a:pPr>
+            <a:r>
+              <a:rPr lang="en-AU" dirty="0">
+                <a:latin typeface="Helvetica Neue" charset="0"/>
+                <a:cs typeface="Helvetica Neue" charset="0"/>
+              </a:rPr>
+              <a:t>Able to transmit sensor data with all the nodes</a:t>
+            </a:r>
+          </a:p>
+          <a:p>
+            <a:pPr marL="285750" indent="-285750">
+              <a:buFont typeface="Arial" panose="020B0604020202020204" pitchFamily="34" charset="0"/>
+              <a:buChar char="•"/>
+            </a:pPr>
+            <a:r>
+              <a:rPr lang="en-AU" dirty="0">
+                <a:latin typeface="Helvetica Neue" charset="0"/>
+                <a:cs typeface="Helvetica Neue" charset="0"/>
+              </a:rPr>
+              <a:t>Each node can relay information received from the other nodes.</a:t>
+            </a:r>
+          </a:p>
+          <a:p>
+            <a:pPr marL="285750" indent="-285750">
+              <a:buFont typeface="Arial" panose="020B0604020202020204" pitchFamily="34" charset="0"/>
+              <a:buChar char="•"/>
+            </a:pPr>
+            <a:r>
+              <a:rPr lang="en-AU" dirty="0">
+                <a:latin typeface="Helvetica Neue" charset="0"/>
+                <a:cs typeface="Helvetica Neue" charset="0"/>
+              </a:rPr>
+              <a:t>Base node automatically connects to mobile nodes</a:t>
+            </a:r>
+          </a:p>
+          <a:p>
+            <a:pPr marL="285750" indent="-285750">
+              <a:buFont typeface="Arial" panose="020B0604020202020204" pitchFamily="34" charset="0"/>
+              <a:buChar char="•"/>
+            </a:pPr>
+            <a:endParaRPr lang="en-AU" dirty="0">
               <a:latin typeface="Helvetica Neue" charset="0"/>
               <a:cs typeface="Helvetica Neue" charset="0"/>
             </a:endParaRPr>
           </a:p>
           <a:p>
             <a:r>
-              <a:rPr lang="en-US" b="1" dirty="0">
-                <a:latin typeface="Helvetica Neue" charset="0"/>
-                <a:cs typeface="Helvetica Neue" charset="0"/>
-              </a:rPr>
-              <a:t>Data Transmission Reliability</a:t>
-            </a:r>
-          </a:p>
-          <a:p>
-            <a:endParaRPr lang="en-US" b="1" dirty="0">
-              <a:latin typeface="Helvetica Neue" charset="0"/>
-              <a:cs typeface="Helvetica Neue" charset="0"/>
-            </a:endParaRPr>
-          </a:p>
-          <a:p>
-            <a:r>
-              <a:rPr lang="en-US" b="1" dirty="0">
-                <a:latin typeface="Helvetica Neue" charset="0"/>
-                <a:cs typeface="Helvetica Neue" charset="0"/>
-              </a:rPr>
-              <a:t>Real-Time </a:t>
-            </a:r>
-            <a:r>
-              <a:rPr lang="en-US" b="1" dirty="0" err="1">
-                <a:latin typeface="Helvetica Neue" charset="0"/>
-                <a:cs typeface="Helvetica Neue" charset="0"/>
-              </a:rPr>
-              <a:t>Visualisation</a:t>
-            </a:r>
-            <a:endParaRPr lang="en-US" b="1" dirty="0">
-              <a:latin typeface="Helvetica Neue" charset="0"/>
-              <a:cs typeface="Helvetica Neue" charset="0"/>
-            </a:endParaRPr>
-          </a:p>
-          <a:p>
-            <a:endParaRPr lang="en-US" b="1" dirty="0">
-              <a:latin typeface="Helvetica Neue" charset="0"/>
-              <a:cs typeface="Helvetica Neue" charset="0"/>
-            </a:endParaRPr>
-          </a:p>
-          <a:p>
-            <a:r>
-              <a:rPr lang="en-US" b="1" dirty="0">
-                <a:latin typeface="Helvetica Neue" charset="0"/>
-                <a:cs typeface="Helvetica Neue" charset="0"/>
-              </a:rPr>
-              <a:t>Node Health Monitoring</a:t>
-            </a:r>
-          </a:p>
-          <a:p>
-            <a:endParaRPr lang="en-US" b="1" dirty="0">
-              <a:latin typeface="Helvetica Neue" charset="0"/>
-              <a:cs typeface="Helvetica Neue" charset="0"/>
-            </a:endParaRPr>
-          </a:p>
-          <a:p>
-            <a:r>
-              <a:rPr lang="en-US" b="1" dirty="0">
-                <a:latin typeface="Helvetica Neue" charset="0"/>
-                <a:cs typeface="Helvetica Neue" charset="0"/>
-              </a:rPr>
-              <a:t>User Engagement and Feedback</a:t>
-            </a:r>
-            <a:endParaRPr lang="en-AU" dirty="0">
-              <a:latin typeface="Bodoni MT" charset="0"/>
-              <a:cs typeface="Helvetica Neue" charset="0"/>
-            </a:endParaRPr>
-          </a:p>
-          <a:p>
-            <a:endParaRPr lang="en-US" sz="1800" dirty="0">
-              <a:latin typeface="Bodoni MT" charset="0"/>
-              <a:cs typeface="Helvetica Neue" charset="0"/>
-            </a:endParaRPr>
-          </a:p>
-          <a:p>
-            <a:r>
-              <a:rPr lang="en-US" sz="1800" dirty="0">
-                <a:latin typeface="Bodoni MT" charset="0"/>
-                <a:cs typeface="Helvetica Neue" charset="0"/>
-              </a:rPr>
-              <a:t>SYSTEM OVERVIEW</a:t>
-            </a:r>
-          </a:p>
-          <a:p>
-            <a:r>
               <a:rPr lang="en-AU" b="1" dirty="0">
                 <a:latin typeface="Helvetica Neue" charset="0"/>
                 <a:cs typeface="Helvetica Neue" charset="0"/>
               </a:rPr>
-              <a:t>Hardware Architecture</a:t>
-            </a:r>
-          </a:p>
-          <a:p>
+              <a:t>Data Transmission and Reliability</a:t>
+            </a:r>
+          </a:p>
+          <a:p>
+            <a:pPr marL="285750" indent="-285750">
+              <a:buFont typeface="Arial" panose="020B0604020202020204" pitchFamily="34" charset="0"/>
+              <a:buChar char="•"/>
+            </a:pPr>
+            <a:r>
+              <a:rPr lang="en-AU" dirty="0">
+                <a:latin typeface="Helvetica Neue" charset="0"/>
+                <a:cs typeface="Helvetica Neue" charset="0"/>
+              </a:rPr>
+              <a:t>Reliable and quicker data transmissions</a:t>
+            </a:r>
+          </a:p>
+          <a:p>
+            <a:pPr marL="285750" indent="-285750">
+              <a:buFont typeface="Arial" panose="020B0604020202020204" pitchFamily="34" charset="0"/>
+              <a:buChar char="•"/>
+            </a:pPr>
+            <a:r>
+              <a:rPr lang="en-AU" dirty="0">
+                <a:latin typeface="Helvetica Neue" charset="0"/>
+                <a:cs typeface="Helvetica Neue" charset="0"/>
+              </a:rPr>
+              <a:t>All the information for a sensor is received in a single packet</a:t>
+            </a:r>
+          </a:p>
+          <a:p>
+            <a:pPr marL="285750" indent="-285750">
+              <a:buFont typeface="Arial" panose="020B0604020202020204" pitchFamily="34" charset="0"/>
+              <a:buChar char="•"/>
+            </a:pPr>
             <a:endParaRPr lang="en-AU" b="1" dirty="0">
               <a:latin typeface="Helvetica Neue" charset="0"/>
               <a:cs typeface="Helvetica Neue" charset="0"/>
@@ -2824,39 +2851,31 @@
                 <a:latin typeface="Helvetica Neue" charset="0"/>
                 <a:cs typeface="Helvetica Neue" charset="0"/>
               </a:rPr>
-              <a:t>Top Level Flowchart of Software Implementation</a:t>
-            </a:r>
+              <a:t>Real-Time Visualisation</a:t>
+            </a:r>
+          </a:p>
+          <a:p>
+            <a:pPr marL="285750" indent="-285750">
+              <a:buFont typeface="Arial" panose="020B0604020202020204" pitchFamily="34" charset="0"/>
+              <a:buChar char="•"/>
+            </a:pPr>
+            <a:r>
+              <a:rPr lang="en-AU" dirty="0">
+                <a:latin typeface="Helvetica Neue" charset="0"/>
+                <a:cs typeface="Helvetica Neue" charset="0"/>
+              </a:rPr>
+              <a:t>Visually displays all data points</a:t>
+            </a:r>
+          </a:p>
+          <a:p>
+            <a:pPr marL="285750" indent="-285750">
+              <a:buFont typeface="Arial" panose="020B0604020202020204" pitchFamily="34" charset="0"/>
+              <a:buChar char="•"/>
+            </a:pPr>
             <a:endParaRPr lang="en-AU" dirty="0">
-              <a:latin typeface="Bodoni MT" charset="0"/>
-              <a:cs typeface="Helvetica Neue" charset="0"/>
-            </a:endParaRPr>
-          </a:p>
-          <a:p>
-            <a:endParaRPr lang="en-US" sz="1800" dirty="0">
-              <a:latin typeface="Bodoni MT" charset="0"/>
-              <a:cs typeface="Helvetica Neue" charset="0"/>
-            </a:endParaRPr>
-          </a:p>
-          <a:p>
-            <a:endParaRPr lang="en-US" sz="1800" dirty="0">
-              <a:latin typeface="Bodoni MT" charset="0"/>
-              <a:cs typeface="Helvetica Neue" charset="0"/>
-            </a:endParaRPr>
-          </a:p>
-          <a:p>
-            <a:endParaRPr lang="en-US" sz="1800" dirty="0">
-              <a:latin typeface="Bodoni MT" charset="0"/>
-              <a:cs typeface="Helvetica Neue" charset="0"/>
-            </a:endParaRPr>
-          </a:p>
-          <a:p>
-            <a:r>
-              <a:rPr lang="en-US" sz="1800" dirty="0">
-                <a:latin typeface="Bodoni MT" charset="0"/>
-                <a:cs typeface="Helvetica Neue" charset="0"/>
-              </a:rPr>
-              <a:t>RESULTS</a:t>
-            </a:r>
+              <a:latin typeface="Helvetica Neue" charset="0"/>
+              <a:cs typeface="Helvetica Neue" charset="0"/>
+            </a:endParaRPr>
           </a:p>
           <a:p>
             <a:r>
@@ -2864,8 +2883,63 @@
                 <a:latin typeface="Helvetica Neue" charset="0"/>
                 <a:cs typeface="Helvetica Neue" charset="0"/>
               </a:rPr>
-              <a:t>Top Level Flowchart of Software Implementation</a:t>
-            </a:r>
+              <a:t>Node Health Monitoring</a:t>
+            </a:r>
+          </a:p>
+          <a:p>
+            <a:pPr marL="285750" indent="-285750">
+              <a:buFont typeface="Arial" panose="020B0604020202020204" pitchFamily="34" charset="0"/>
+              <a:buChar char="•"/>
+            </a:pPr>
+            <a:r>
+              <a:rPr lang="en-AU" dirty="0">
+                <a:latin typeface="Helvetica Neue" charset="0"/>
+                <a:cs typeface="Helvetica Neue" charset="0"/>
+              </a:rPr>
+              <a:t>Ds</a:t>
+            </a:r>
+          </a:p>
+          <a:p>
+            <a:pPr marL="285750" indent="-285750">
+              <a:buFont typeface="Arial" panose="020B0604020202020204" pitchFamily="34" charset="0"/>
+              <a:buChar char="•"/>
+            </a:pPr>
+            <a:endParaRPr lang="en-AU" b="1" dirty="0">
+              <a:latin typeface="Helvetica Neue" charset="0"/>
+              <a:cs typeface="Helvetica Neue" charset="0"/>
+            </a:endParaRPr>
+          </a:p>
+          <a:p>
+            <a:r>
+              <a:rPr lang="en-AU" b="1" dirty="0">
+                <a:latin typeface="Helvetica Neue" charset="0"/>
+                <a:cs typeface="Helvetica Neue" charset="0"/>
+              </a:rPr>
+              <a:t>User Engagement and Feedback</a:t>
+            </a:r>
+          </a:p>
+          <a:p>
+            <a:pPr marL="285750" indent="-285750">
+              <a:buFont typeface="Arial" panose="020B0604020202020204" pitchFamily="34" charset="0"/>
+              <a:buChar char="•"/>
+            </a:pPr>
+            <a:r>
+              <a:rPr lang="en-AU" dirty="0" err="1">
+                <a:latin typeface="Helvetica Neue" charset="0"/>
+                <a:cs typeface="Helvetica Neue" charset="0"/>
+              </a:rPr>
+              <a:t>dsa</a:t>
+            </a:r>
+            <a:endParaRPr lang="en-AU" dirty="0">
+              <a:latin typeface="Helvetica Neue" charset="0"/>
+              <a:cs typeface="Helvetica Neue" charset="0"/>
+            </a:endParaRPr>
+          </a:p>
+          <a:p>
+            <a:pPr marL="285750" indent="-285750">
+              <a:buFont typeface="Arial" panose="020B0604020202020204" pitchFamily="34" charset="0"/>
+              <a:buChar char="•"/>
+            </a:pPr>
             <a:endParaRPr lang="en-AU" dirty="0">
               <a:latin typeface="Bodoni MT" charset="0"/>
               <a:cs typeface="Helvetica Neue" charset="0"/>
@@ -2917,6 +2991,834 @@
                 <a:latin typeface="Bodoni MT" charset="0"/>
                 <a:cs typeface="Helvetica Neue" charset="0"/>
               </a:rPr>
+              <a:t>PROJECT CONFIGURABILITY AND FIELD DEPLOYING PLAN</a:t>
+            </a:r>
+            <a:endParaRPr lang="en-US" dirty="0">
+              <a:latin typeface="Bodoni MT" charset="0"/>
+              <a:cs typeface="Helvetica Neue" charset="0"/>
+            </a:endParaRPr>
+          </a:p>
+          <a:p>
+            <a:r>
+              <a:rPr lang="en-AU" b="1" dirty="0">
+                <a:latin typeface="Helvetica Neue" charset="0"/>
+                <a:cs typeface="Helvetica Neue" charset="0"/>
+              </a:rPr>
+              <a:t>Bluetooth Packets:</a:t>
+            </a:r>
+          </a:p>
+          <a:p>
+            <a:pPr marL="285750" indent="-285750">
+              <a:buFont typeface="Arial" panose="020B0604020202020204" pitchFamily="34" charset="0"/>
+              <a:buChar char="•"/>
+            </a:pPr>
+            <a:r>
+              <a:rPr lang="en-AU" dirty="0">
+                <a:latin typeface="Helvetica Neue" charset="0"/>
+                <a:cs typeface="Helvetica Neue" charset="0"/>
+              </a:rPr>
+              <a:t>Packets bytes are allocated to certain information, such as:</a:t>
+            </a:r>
+          </a:p>
+          <a:p>
+            <a:pPr marL="1449388" lvl="1" indent="-285750">
+              <a:buFont typeface="Arial" panose="020B0604020202020204" pitchFamily="34" charset="0"/>
+              <a:buChar char="•"/>
+            </a:pPr>
+            <a:r>
+              <a:rPr lang="en-AU" sz="1400" dirty="0">
+                <a:latin typeface="Helvetica Neue" charset="0"/>
+                <a:cs typeface="Helvetica Neue" charset="0"/>
+              </a:rPr>
+              <a:t>Sensor Type ID</a:t>
+            </a:r>
+          </a:p>
+          <a:p>
+            <a:pPr marL="1449388" lvl="1" indent="-285750">
+              <a:buFont typeface="Arial" panose="020B0604020202020204" pitchFamily="34" charset="0"/>
+              <a:buChar char="•"/>
+            </a:pPr>
+            <a:r>
+              <a:rPr lang="en-AU" sz="1400" dirty="0">
+                <a:latin typeface="Helvetica Neue" charset="0"/>
+                <a:cs typeface="Helvetica Neue" charset="0"/>
+              </a:rPr>
+              <a:t>Original Signal ID</a:t>
+            </a:r>
+          </a:p>
+          <a:p>
+            <a:pPr marL="1449388" lvl="1" indent="-285750">
+              <a:buFont typeface="Arial" panose="020B0604020202020204" pitchFamily="34" charset="0"/>
+              <a:buChar char="•"/>
+            </a:pPr>
+            <a:r>
+              <a:rPr lang="en-AU" sz="1400" dirty="0">
+                <a:latin typeface="Helvetica Neue" charset="0"/>
+                <a:cs typeface="Helvetica Neue" charset="0"/>
+              </a:rPr>
+              <a:t>Current Signal ID</a:t>
+            </a:r>
+          </a:p>
+          <a:p>
+            <a:pPr marL="285750" indent="-285750">
+              <a:buFont typeface="Arial" panose="020B0604020202020204" pitchFamily="34" charset="0"/>
+              <a:buChar char="•"/>
+            </a:pPr>
+            <a:r>
+              <a:rPr lang="en-AU" dirty="0">
+                <a:latin typeface="Helvetica Neue" charset="0"/>
+                <a:cs typeface="Helvetica Neue" charset="0"/>
+              </a:rPr>
+              <a:t>The user can configure their own ID to allow different sensor information or allow more nodes to be used.</a:t>
+            </a:r>
+            <a:endParaRPr lang="en-US" sz="1800" dirty="0">
+              <a:latin typeface="Bodoni MT" charset="0"/>
+              <a:cs typeface="Helvetica Neue" charset="0"/>
+            </a:endParaRPr>
+          </a:p>
+          <a:p>
+            <a:endParaRPr lang="en-US" sz="1800" dirty="0">
+              <a:latin typeface="Bodoni MT" charset="0"/>
+              <a:cs typeface="Helvetica Neue" charset="0"/>
+            </a:endParaRPr>
+          </a:p>
+          <a:p>
+            <a:endParaRPr lang="en-US" sz="1800" dirty="0">
+              <a:latin typeface="Bodoni MT" charset="0"/>
+              <a:cs typeface="Helvetica Neue" charset="0"/>
+            </a:endParaRPr>
+          </a:p>
+          <a:p>
+            <a:endParaRPr lang="en-US" sz="1800" dirty="0">
+              <a:latin typeface="Bodoni MT" charset="0"/>
+              <a:cs typeface="Helvetica Neue" charset="0"/>
+            </a:endParaRPr>
+          </a:p>
+          <a:p>
+            <a:r>
+              <a:rPr lang="en-US" sz="1800" dirty="0">
+                <a:latin typeface="Bodoni MT" charset="0"/>
+                <a:cs typeface="Helvetica Neue" charset="0"/>
+              </a:rPr>
+              <a:t>CONCLUSION (Success of achieving KPI)</a:t>
+            </a:r>
+            <a:endParaRPr lang="en-US" sz="1800" dirty="0">
+              <a:latin typeface="Helvetica Neue" charset="0"/>
+              <a:cs typeface="Helvetica Neue" charset="0"/>
+            </a:endParaRPr>
+          </a:p>
+        </p:txBody>
+      </p:sp>
+      <p:pic>
+        <p:nvPicPr>
+          <p:cNvPr id="2" name="Picture 1">
+            <a:extLst>
+              <a:ext uri="{FF2B5EF4-FFF2-40B4-BE49-F238E27FC236}">
+                <a16:creationId xmlns:a16="http://schemas.microsoft.com/office/drawing/2014/main" id="{E0DCCF1E-F8FA-6938-3752-6E547FAFB575}"/>
+              </a:ext>
+            </a:extLst>
+          </p:cNvPr>
+          <p:cNvPicPr>
+            <a:picLocks noChangeAspect="1"/>
+          </p:cNvPicPr>
+          <p:nvPr/>
+        </p:nvPicPr>
+        <p:blipFill>
+          <a:blip r:embed="rId2"/>
+          <a:stretch>
+            <a:fillRect/>
+          </a:stretch>
+        </p:blipFill>
+        <p:spPr>
+          <a:xfrm>
+            <a:off x="3929646" y="2108089"/>
+            <a:ext cx="3219870" cy="1172994"/>
+          </a:xfrm>
+          <a:prstGeom prst="rect">
+            <a:avLst/>
+          </a:prstGeom>
+        </p:spPr>
+      </p:pic>
+    </p:spTree>
+  </p:cSld>
+  <p:clrMapOvr>
+    <a:masterClrMapping/>
+  </p:clrMapOvr>
+</p:sld>
+</file>
+
+<file path=ppt/slides/slide2.xml><?xml version="1.0" encoding="utf-8"?>
+<p:sld xmlns:a="http://schemas.openxmlformats.org/drawingml/2006/main" xmlns:r="http://schemas.openxmlformats.org/officeDocument/2006/relationships" xmlns:p="http://schemas.openxmlformats.org/presentationml/2006/main">
+  <p:cSld>
+    <p:spTree>
+      <p:nvGrpSpPr>
+        <p:cNvPr id="1" name=""/>
+        <p:cNvGrpSpPr/>
+        <p:nvPr/>
+      </p:nvGrpSpPr>
+      <p:grpSpPr>
+        <a:xfrm>
+          <a:off x="0" y="0"/>
+          <a:ext cx="0" cy="0"/>
+          <a:chOff x="0" y="0"/>
+          <a:chExt cx="0" cy="0"/>
+        </a:xfrm>
+      </p:grpSpPr>
+      <p:sp>
+        <p:nvSpPr>
+          <p:cNvPr id="3074" name="Content Placeholder 1"/>
+          <p:cNvSpPr>
+            <a:spLocks noGrp="1"/>
+          </p:cNvSpPr>
+          <p:nvPr>
+            <p:ph idx="1"/>
+          </p:nvPr>
+        </p:nvSpPr>
+        <p:spPr>
+          <a:xfrm>
+            <a:off x="112713" y="1270000"/>
+            <a:ext cx="3498850" cy="7656513"/>
+          </a:xfrm>
+          <a:ln/>
+        </p:spPr>
+        <p:txBody>
+          <a:bodyPr/>
+          <a:lstStyle/>
+          <a:p>
+            <a:r>
+              <a:rPr lang="en-US" sz="1800" dirty="0">
+                <a:latin typeface="Bodoni MT" charset="0"/>
+                <a:cs typeface="Helvetica Neue" charset="0"/>
+              </a:rPr>
+              <a:t>MAIN HEADINGS – BODONI MT 18PT ALL CAPS</a:t>
+            </a:r>
+          </a:p>
+          <a:p>
+            <a:endParaRPr lang="en-US" sz="1600" dirty="0">
+              <a:latin typeface="Bodoni MT" charset="0"/>
+              <a:cs typeface="Helvetica Neue" charset="0"/>
+            </a:endParaRPr>
+          </a:p>
+          <a:p>
+            <a:r>
+              <a:rPr lang="en-US" b="1" dirty="0">
+                <a:latin typeface="Helvetica Neue" charset="0"/>
+                <a:cs typeface="Helvetica Neue" charset="0"/>
+              </a:rPr>
+              <a:t>Subheadings – Helvetica Neue Bold 14pt</a:t>
+            </a:r>
+          </a:p>
+          <a:p>
+            <a:r>
+              <a:rPr lang="en-US" dirty="0">
+                <a:latin typeface="Helvetica Neue" charset="0"/>
+                <a:cs typeface="Helvetica Neue" charset="0"/>
+              </a:rPr>
+              <a:t>Body Text – Helvetica Neue 14pt (min 12pt)</a:t>
+            </a:r>
+          </a:p>
+          <a:p>
+            <a:endParaRPr lang="en-US" dirty="0">
+              <a:latin typeface="Helvetica Neue" charset="0"/>
+              <a:cs typeface="Helvetica Neue" charset="0"/>
+            </a:endParaRPr>
+          </a:p>
+          <a:p>
+            <a:r>
+              <a:rPr lang="en-US" b="1" dirty="0">
+                <a:latin typeface="Helvetica Neue" charset="0"/>
+                <a:cs typeface="Helvetica Neue" charset="0"/>
+              </a:rPr>
+              <a:t>Don’t have the above fonts installed?</a:t>
+            </a:r>
+          </a:p>
+          <a:p>
+            <a:r>
+              <a:rPr lang="en-US" dirty="0">
+                <a:latin typeface="Helvetica Neue" charset="0"/>
+                <a:cs typeface="Helvetica Neue" charset="0"/>
+              </a:rPr>
+              <a:t>Substitutes for Bodoni MT:</a:t>
+            </a:r>
+          </a:p>
+          <a:p>
+            <a:r>
+              <a:rPr lang="en-US" dirty="0">
+                <a:latin typeface="Didot" charset="0"/>
+                <a:cs typeface="Helvetica Neue" charset="0"/>
+              </a:rPr>
+              <a:t>Didot on Apple</a:t>
+            </a:r>
+          </a:p>
+          <a:p>
+            <a:r>
+              <a:rPr lang="en-US" dirty="0">
+                <a:latin typeface="Times New Roman" charset="0"/>
+                <a:cs typeface="Times New Roman" charset="0"/>
+              </a:rPr>
+              <a:t>or Times New Roman (Apple &amp; Windows)</a:t>
+            </a:r>
+          </a:p>
+          <a:p>
+            <a:endParaRPr lang="en-US" dirty="0">
+              <a:latin typeface="Helvetica Neue" charset="0"/>
+              <a:cs typeface="Helvetica Neue" charset="0"/>
+            </a:endParaRPr>
+          </a:p>
+          <a:p>
+            <a:r>
+              <a:rPr lang="en-US" dirty="0">
+                <a:latin typeface="Helvetica Neue" charset="0"/>
+                <a:cs typeface="Helvetica Neue" charset="0"/>
+              </a:rPr>
+              <a:t>Substitutes for Helvetica Neue:</a:t>
+            </a:r>
+          </a:p>
+          <a:p>
+            <a:r>
+              <a:rPr lang="en-US" dirty="0">
+                <a:latin typeface="Helvetica" charset="0"/>
+                <a:cs typeface="Helvetica" charset="0"/>
+              </a:rPr>
+              <a:t>Helvetica (Apple)</a:t>
+            </a:r>
+          </a:p>
+          <a:p>
+            <a:r>
+              <a:rPr lang="en-US" dirty="0">
+                <a:latin typeface="Arial" charset="0"/>
+                <a:cs typeface="Arial" charset="0"/>
+              </a:rPr>
+              <a:t>or Arial (Apple &amp; Windows)</a:t>
+            </a:r>
+          </a:p>
+          <a:p>
+            <a:endParaRPr lang="en-US" dirty="0">
+              <a:latin typeface="Helvetica Neue" charset="0"/>
+              <a:cs typeface="Helvetica Neue" charset="0"/>
+            </a:endParaRPr>
+          </a:p>
+        </p:txBody>
+      </p:sp>
+      <p:sp>
+        <p:nvSpPr>
+          <p:cNvPr id="3075" name="Title 2"/>
+          <p:cNvSpPr>
+            <a:spLocks noGrp="1"/>
+          </p:cNvSpPr>
+          <p:nvPr>
+            <p:ph type="title"/>
+          </p:nvPr>
+        </p:nvSpPr>
+        <p:spPr>
+          <a:xfrm>
+            <a:off x="0" y="-25400"/>
+            <a:ext cx="14762163" cy="698500"/>
+          </a:xfrm>
+        </p:spPr>
+        <p:txBody>
+          <a:bodyPr/>
+          <a:lstStyle/>
+          <a:p>
+            <a:r>
+              <a:rPr lang="en-US" cap="none" dirty="0">
+                <a:latin typeface="Bodoni MT" charset="0"/>
+                <a:cs typeface="Didot" charset="0"/>
+              </a:rPr>
+              <a:t>OUTDOOR WEATHER STATION NETWORK</a:t>
+            </a:r>
+          </a:p>
+        </p:txBody>
+      </p:sp>
+      <p:sp>
+        <p:nvSpPr>
+          <p:cNvPr id="3076" name="Subtitle 3"/>
+          <p:cNvSpPr>
+            <a:spLocks noGrp="1"/>
+          </p:cNvSpPr>
+          <p:nvPr>
+            <p:ph type="subTitle" idx="10"/>
+          </p:nvPr>
+        </p:nvSpPr>
+        <p:spPr>
+          <a:xfrm>
+            <a:off x="4403725" y="673100"/>
+            <a:ext cx="10331450" cy="441325"/>
+          </a:xfrm>
+        </p:spPr>
+        <p:txBody>
+          <a:bodyPr/>
+          <a:lstStyle/>
+          <a:p>
+            <a:pPr>
+              <a:spcBef>
+                <a:spcPct val="0"/>
+              </a:spcBef>
+            </a:pPr>
+            <a:r>
+              <a:rPr lang="en-US" dirty="0">
+                <a:latin typeface="Helvetica Neue" charset="0"/>
+                <a:cs typeface="Helvetica Neue" charset="0"/>
+              </a:rPr>
+              <a:t>Ty Behnke, Marcus Nguyen (Team A))</a:t>
+            </a:r>
+          </a:p>
+        </p:txBody>
+      </p:sp>
+      <p:sp>
+        <p:nvSpPr>
+          <p:cNvPr id="3077" name="Content Placeholder 7"/>
+          <p:cNvSpPr>
+            <a:spLocks noGrp="1"/>
+          </p:cNvSpPr>
+          <p:nvPr>
+            <p:ph idx="11"/>
+          </p:nvPr>
+        </p:nvSpPr>
+        <p:spPr>
+          <a:xfrm>
+            <a:off x="3789363" y="1270000"/>
+            <a:ext cx="3500437" cy="7656513"/>
+          </a:xfrm>
+          <a:ln/>
+        </p:spPr>
+        <p:txBody>
+          <a:bodyPr/>
+          <a:lstStyle/>
+          <a:p>
+            <a:r>
+              <a:rPr lang="en-US" b="1" dirty="0">
+                <a:latin typeface="Helvetica Neue" charset="0"/>
+                <a:cs typeface="Helvetica Neue" charset="0"/>
+              </a:rPr>
+              <a:t>General Hints &amp; Tips</a:t>
+            </a:r>
+          </a:p>
+          <a:p>
+            <a:r>
+              <a:rPr lang="en-US" b="1" i="1" dirty="0">
+                <a:latin typeface="Helvetica Neue" charset="0"/>
+                <a:cs typeface="Helvetica Neue" charset="0"/>
+              </a:rPr>
+              <a:t>Do not </a:t>
+            </a:r>
+            <a:r>
+              <a:rPr lang="en-US" dirty="0">
+                <a:latin typeface="Helvetica Neue" charset="0"/>
+                <a:cs typeface="Helvetica Neue" charset="0"/>
+              </a:rPr>
+              <a:t>change the </a:t>
+            </a:r>
+            <a:r>
+              <a:rPr lang="en-US" dirty="0" err="1">
+                <a:latin typeface="Helvetica Neue" charset="0"/>
+                <a:cs typeface="Helvetica Neue" charset="0"/>
+              </a:rPr>
+              <a:t>colour</a:t>
+            </a:r>
+            <a:r>
+              <a:rPr lang="en-US" dirty="0">
+                <a:latin typeface="Helvetica Neue" charset="0"/>
+                <a:cs typeface="Helvetica Neue" charset="0"/>
+              </a:rPr>
+              <a:t>/size/logos/positioning of the Slide Master.</a:t>
+            </a:r>
+          </a:p>
+          <a:p>
+            <a:r>
+              <a:rPr lang="en-US" dirty="0">
+                <a:latin typeface="Helvetica Neue" charset="0"/>
+                <a:cs typeface="Helvetica Neue" charset="0"/>
+              </a:rPr>
+              <a:t>This is a standard format across all Innovation Expo posters.</a:t>
+            </a:r>
+          </a:p>
+          <a:p>
+            <a:r>
+              <a:rPr lang="en-US" b="1" i="1" dirty="0">
+                <a:latin typeface="Helvetica Neue" charset="0"/>
+                <a:cs typeface="Helvetica Neue" charset="0"/>
+              </a:rPr>
+              <a:t>Do not </a:t>
+            </a:r>
+            <a:r>
+              <a:rPr lang="en-US" dirty="0">
+                <a:latin typeface="Helvetica Neue" charset="0"/>
+                <a:cs typeface="Helvetica Neue" charset="0"/>
+              </a:rPr>
+              <a:t>add other corporate logos. This is an infringement of copyright, unless you have express permission to do so.</a:t>
+            </a:r>
+          </a:p>
+          <a:p>
+            <a:r>
+              <a:rPr lang="en-US" b="1" i="1" dirty="0">
+                <a:latin typeface="Helvetica Neue" charset="0"/>
+                <a:cs typeface="Helvetica Neue" charset="0"/>
+              </a:rPr>
+              <a:t>Do</a:t>
+            </a:r>
+            <a:r>
+              <a:rPr lang="en-US" dirty="0">
+                <a:latin typeface="Helvetica Neue" charset="0"/>
+                <a:cs typeface="Helvetica Neue" charset="0"/>
+              </a:rPr>
+              <a:t> use this space as creatively as you wish.</a:t>
+            </a:r>
+          </a:p>
+          <a:p>
+            <a:r>
+              <a:rPr lang="en-US" b="1" i="1" dirty="0">
+                <a:latin typeface="Helvetica Neue" charset="0"/>
+                <a:cs typeface="Helvetica Neue" charset="0"/>
+              </a:rPr>
+              <a:t>Avoid </a:t>
+            </a:r>
+            <a:r>
+              <a:rPr lang="en-US" dirty="0">
+                <a:latin typeface="Helvetica Neue" charset="0"/>
+                <a:cs typeface="Helvetica Neue" charset="0"/>
+              </a:rPr>
+              <a:t>using large background </a:t>
+            </a:r>
+            <a:r>
+              <a:rPr lang="en-US" dirty="0" err="1">
+                <a:latin typeface="Helvetica Neue" charset="0"/>
+                <a:cs typeface="Helvetica Neue" charset="0"/>
+              </a:rPr>
+              <a:t>colours</a:t>
+            </a:r>
+            <a:r>
+              <a:rPr lang="en-US" dirty="0">
+                <a:latin typeface="Helvetica Neue" charset="0"/>
+                <a:cs typeface="Helvetica Neue" charset="0"/>
+              </a:rPr>
+              <a:t> – doesn’t print well.</a:t>
+            </a:r>
+          </a:p>
+          <a:p>
+            <a:r>
+              <a:rPr lang="en-US" b="1" i="1" dirty="0">
+                <a:latin typeface="Helvetica Neue" charset="0"/>
+                <a:cs typeface="Helvetica Neue" charset="0"/>
+              </a:rPr>
+              <a:t>Stick to </a:t>
+            </a:r>
+            <a:r>
+              <a:rPr lang="en-US" dirty="0">
+                <a:latin typeface="Helvetica Neue" charset="0"/>
+                <a:cs typeface="Helvetica Neue" charset="0"/>
+              </a:rPr>
+              <a:t>the basic fonts &amp; sizes (left) – these read clearly. If you need to reduce the text size, you are trying to put too much on your poster.</a:t>
+            </a:r>
+          </a:p>
+          <a:p>
+            <a:r>
+              <a:rPr lang="en-US" b="1" i="1" dirty="0">
+                <a:latin typeface="Helvetica Neue" charset="0"/>
+                <a:cs typeface="Helvetica Neue" charset="0"/>
+              </a:rPr>
+              <a:t>As a check</a:t>
+            </a:r>
+            <a:r>
+              <a:rPr lang="en-US" dirty="0">
+                <a:latin typeface="Helvetica Neue" charset="0"/>
+                <a:cs typeface="Helvetica Neue" charset="0"/>
+              </a:rPr>
+              <a:t>, print “scaled to fit” onto A4 and read at arms length.</a:t>
+            </a:r>
+          </a:p>
+          <a:p>
+            <a:r>
+              <a:rPr lang="en-US" b="1" i="1" dirty="0">
+                <a:latin typeface="Helvetica Neue" charset="0"/>
+                <a:cs typeface="Helvetica Neue" charset="0"/>
+              </a:rPr>
+              <a:t>Save </a:t>
+            </a:r>
+            <a:r>
+              <a:rPr lang="en-US" dirty="0">
+                <a:latin typeface="Helvetica Neue" charset="0"/>
+                <a:cs typeface="Helvetica Neue" charset="0"/>
+              </a:rPr>
+              <a:t>your poster as you work on it.</a:t>
+            </a:r>
+          </a:p>
+          <a:p>
+            <a:r>
+              <a:rPr lang="en-US" b="1" i="1" dirty="0">
+                <a:latin typeface="Helvetica Neue" charset="0"/>
+                <a:cs typeface="Helvetica Neue" charset="0"/>
+              </a:rPr>
+              <a:t>You shouldn’t</a:t>
+            </a:r>
+            <a:r>
+              <a:rPr lang="en-US" dirty="0">
+                <a:latin typeface="Helvetica Neue" charset="0"/>
+                <a:cs typeface="Helvetica Neue" charset="0"/>
+              </a:rPr>
+              <a:t> need to change the sizing of this file, it should already be landscape format with width: 41cm and height: 28.7 cm (A3 with 5 mm borders all around).</a:t>
+            </a:r>
+          </a:p>
+          <a:p>
+            <a:r>
+              <a:rPr lang="en-US" b="1" i="1" dirty="0">
+                <a:latin typeface="Helvetica Neue" charset="0"/>
+                <a:cs typeface="Helvetica Neue" charset="0"/>
+              </a:rPr>
+              <a:t>The title </a:t>
+            </a:r>
+            <a:r>
+              <a:rPr lang="en-US" dirty="0">
+                <a:latin typeface="Helvetica Neue" charset="0"/>
+                <a:cs typeface="Helvetica Neue" charset="0"/>
+              </a:rPr>
+              <a:t>may look to close to the top edge – don’t be tempted to change it. It allows for the extra 5mm from the printing.</a:t>
+            </a:r>
+          </a:p>
+        </p:txBody>
+      </p:sp>
+      <p:sp>
+        <p:nvSpPr>
+          <p:cNvPr id="3078" name="Content Placeholder 8"/>
+          <p:cNvSpPr>
+            <a:spLocks noGrp="1"/>
+          </p:cNvSpPr>
+          <p:nvPr>
+            <p:ph idx="12"/>
+          </p:nvPr>
+        </p:nvSpPr>
+        <p:spPr>
+          <a:xfrm>
+            <a:off x="7466013" y="1270000"/>
+            <a:ext cx="3500437" cy="7656513"/>
+          </a:xfrm>
+          <a:ln/>
+        </p:spPr>
+        <p:txBody>
+          <a:bodyPr/>
+          <a:lstStyle/>
+          <a:p>
+            <a:r>
+              <a:rPr lang="en-US" sz="1800" dirty="0">
+                <a:latin typeface="Bodoni MT" charset="0"/>
+                <a:cs typeface="Helvetica Neue" charset="0"/>
+              </a:rPr>
+              <a:t>AIMS(KPI)</a:t>
+            </a:r>
+          </a:p>
+          <a:p>
+            <a:r>
+              <a:rPr lang="en-US" b="1" dirty="0">
+                <a:latin typeface="Helvetica Neue" charset="0"/>
+                <a:cs typeface="Helvetica Neue" charset="0"/>
+              </a:rPr>
+              <a:t>Mesh Work Networking</a:t>
+            </a:r>
+          </a:p>
+          <a:p>
+            <a:endParaRPr lang="en-US" b="1" dirty="0">
+              <a:latin typeface="Helvetica Neue" charset="0"/>
+              <a:cs typeface="Helvetica Neue" charset="0"/>
+            </a:endParaRPr>
+          </a:p>
+          <a:p>
+            <a:r>
+              <a:rPr lang="en-US" b="1" dirty="0">
+                <a:latin typeface="Helvetica Neue" charset="0"/>
+                <a:cs typeface="Helvetica Neue" charset="0"/>
+              </a:rPr>
+              <a:t>Data Transmission Reliability</a:t>
+            </a:r>
+          </a:p>
+          <a:p>
+            <a:endParaRPr lang="en-US" b="1" dirty="0">
+              <a:latin typeface="Helvetica Neue" charset="0"/>
+              <a:cs typeface="Helvetica Neue" charset="0"/>
+            </a:endParaRPr>
+          </a:p>
+          <a:p>
+            <a:r>
+              <a:rPr lang="en-US" b="1" dirty="0">
+                <a:latin typeface="Helvetica Neue" charset="0"/>
+                <a:cs typeface="Helvetica Neue" charset="0"/>
+              </a:rPr>
+              <a:t>Real-Time </a:t>
+            </a:r>
+            <a:r>
+              <a:rPr lang="en-US" b="1" dirty="0" err="1">
+                <a:latin typeface="Helvetica Neue" charset="0"/>
+                <a:cs typeface="Helvetica Neue" charset="0"/>
+              </a:rPr>
+              <a:t>Visualisation</a:t>
+            </a:r>
+            <a:endParaRPr lang="en-US" b="1" dirty="0">
+              <a:latin typeface="Helvetica Neue" charset="0"/>
+              <a:cs typeface="Helvetica Neue" charset="0"/>
+            </a:endParaRPr>
+          </a:p>
+          <a:p>
+            <a:endParaRPr lang="en-US" b="1" dirty="0">
+              <a:latin typeface="Helvetica Neue" charset="0"/>
+              <a:cs typeface="Helvetica Neue" charset="0"/>
+            </a:endParaRPr>
+          </a:p>
+          <a:p>
+            <a:r>
+              <a:rPr lang="en-US" b="1" dirty="0">
+                <a:latin typeface="Helvetica Neue" charset="0"/>
+                <a:cs typeface="Helvetica Neue" charset="0"/>
+              </a:rPr>
+              <a:t>Node Health Monitoring</a:t>
+            </a:r>
+          </a:p>
+          <a:p>
+            <a:endParaRPr lang="en-US" b="1" dirty="0">
+              <a:latin typeface="Helvetica Neue" charset="0"/>
+              <a:cs typeface="Helvetica Neue" charset="0"/>
+            </a:endParaRPr>
+          </a:p>
+          <a:p>
+            <a:r>
+              <a:rPr lang="en-US" b="1" dirty="0">
+                <a:latin typeface="Helvetica Neue" charset="0"/>
+                <a:cs typeface="Helvetica Neue" charset="0"/>
+              </a:rPr>
+              <a:t>User Engagement and Feedback</a:t>
+            </a:r>
+            <a:endParaRPr lang="en-AU" dirty="0">
+              <a:latin typeface="Bodoni MT" charset="0"/>
+              <a:cs typeface="Helvetica Neue" charset="0"/>
+            </a:endParaRPr>
+          </a:p>
+          <a:p>
+            <a:endParaRPr lang="en-US" sz="1800" dirty="0">
+              <a:latin typeface="Bodoni MT" charset="0"/>
+              <a:cs typeface="Helvetica Neue" charset="0"/>
+            </a:endParaRPr>
+          </a:p>
+          <a:p>
+            <a:r>
+              <a:rPr lang="en-US" sz="1800" dirty="0">
+                <a:latin typeface="Bodoni MT" charset="0"/>
+                <a:cs typeface="Helvetica Neue" charset="0"/>
+              </a:rPr>
+              <a:t>SYSTEM OVERVIEW</a:t>
+            </a:r>
+          </a:p>
+          <a:p>
+            <a:r>
+              <a:rPr lang="en-AU" b="1" dirty="0">
+                <a:latin typeface="Helvetica Neue" charset="0"/>
+                <a:cs typeface="Helvetica Neue" charset="0"/>
+              </a:rPr>
+              <a:t>Hardware Architecture</a:t>
+            </a:r>
+          </a:p>
+          <a:p>
+            <a:endParaRPr lang="en-AU" b="1" dirty="0">
+              <a:latin typeface="Helvetica Neue" charset="0"/>
+              <a:cs typeface="Helvetica Neue" charset="0"/>
+            </a:endParaRPr>
+          </a:p>
+          <a:p>
+            <a:r>
+              <a:rPr lang="en-AU" b="1" dirty="0">
+                <a:latin typeface="Helvetica Neue" charset="0"/>
+                <a:cs typeface="Helvetica Neue" charset="0"/>
+              </a:rPr>
+              <a:t>Top Level Flowchart of Software Implementation</a:t>
+            </a:r>
+            <a:endParaRPr lang="en-AU" dirty="0">
+              <a:latin typeface="Bodoni MT" charset="0"/>
+              <a:cs typeface="Helvetica Neue" charset="0"/>
+            </a:endParaRPr>
+          </a:p>
+          <a:p>
+            <a:endParaRPr lang="en-US" sz="1800" dirty="0">
+              <a:latin typeface="Bodoni MT" charset="0"/>
+              <a:cs typeface="Helvetica Neue" charset="0"/>
+            </a:endParaRPr>
+          </a:p>
+          <a:p>
+            <a:endParaRPr lang="en-US" sz="1800" dirty="0">
+              <a:latin typeface="Bodoni MT" charset="0"/>
+              <a:cs typeface="Helvetica Neue" charset="0"/>
+            </a:endParaRPr>
+          </a:p>
+          <a:p>
+            <a:endParaRPr lang="en-US" sz="1800" dirty="0">
+              <a:latin typeface="Bodoni MT" charset="0"/>
+              <a:cs typeface="Helvetica Neue" charset="0"/>
+            </a:endParaRPr>
+          </a:p>
+          <a:p>
+            <a:r>
+              <a:rPr lang="en-US" sz="1800" dirty="0">
+                <a:latin typeface="Bodoni MT" charset="0"/>
+                <a:cs typeface="Helvetica Neue" charset="0"/>
+              </a:rPr>
+              <a:t>RESULTS</a:t>
+            </a:r>
+          </a:p>
+          <a:p>
+            <a:r>
+              <a:rPr lang="en-AU" b="1" dirty="0">
+                <a:latin typeface="Helvetica Neue" charset="0"/>
+                <a:cs typeface="Helvetica Neue" charset="0"/>
+              </a:rPr>
+              <a:t>Top Level Flowchart of Software Implementation</a:t>
+            </a:r>
+            <a:endParaRPr lang="en-AU" dirty="0">
+              <a:latin typeface="Bodoni MT" charset="0"/>
+              <a:cs typeface="Helvetica Neue" charset="0"/>
+            </a:endParaRPr>
+          </a:p>
+          <a:p>
+            <a:endParaRPr lang="en-US" sz="1800" dirty="0">
+              <a:latin typeface="Bodoni MT" charset="0"/>
+              <a:cs typeface="Helvetica Neue" charset="0"/>
+            </a:endParaRPr>
+          </a:p>
+          <a:p>
+            <a:endParaRPr lang="en-US" sz="1800" dirty="0">
+              <a:latin typeface="Bodoni MT" charset="0"/>
+              <a:cs typeface="Helvetica Neue" charset="0"/>
+            </a:endParaRPr>
+          </a:p>
+          <a:p>
+            <a:endParaRPr lang="en-US" dirty="0">
+              <a:latin typeface="Helvetica Neue" charset="0"/>
+              <a:cs typeface="Helvetica Neue" charset="0"/>
+            </a:endParaRPr>
+          </a:p>
+        </p:txBody>
+      </p:sp>
+      <p:sp>
+        <p:nvSpPr>
+          <p:cNvPr id="3079" name="Content Placeholder 9"/>
+          <p:cNvSpPr>
+            <a:spLocks noGrp="1"/>
+          </p:cNvSpPr>
+          <p:nvPr>
+            <p:ph idx="13"/>
+          </p:nvPr>
+        </p:nvSpPr>
+        <p:spPr>
+          <a:xfrm>
+            <a:off x="11142663" y="1270000"/>
+            <a:ext cx="3500437" cy="7656513"/>
+          </a:xfrm>
+          <a:ln/>
+        </p:spPr>
+        <p:txBody>
+          <a:bodyPr/>
+          <a:lstStyle/>
+          <a:p>
+            <a:r>
+              <a:rPr lang="en-US" sz="1800" dirty="0">
+                <a:latin typeface="Bodoni MT" charset="0"/>
+                <a:cs typeface="Helvetica Neue" charset="0"/>
+              </a:rPr>
               <a:t>KEY PERFORMANCE INDICATORS</a:t>
             </a:r>
           </a:p>
@@ -2995,6 +3897,11 @@
         </p:txBody>
       </p:sp>
     </p:spTree>
+    <p:extLst>
+      <p:ext uri="{BB962C8B-B14F-4D97-AF65-F5344CB8AC3E}">
+        <p14:creationId xmlns:p14="http://schemas.microsoft.com/office/powerpoint/2010/main" val="644116303"/>
+      </p:ext>
+    </p:extLst>
   </p:cSld>
   <p:clrMapOvr>
     <a:masterClrMapping/>

</xml_diff>